<commit_message>
[in review] update caravel board Nucleo-144 hat
</commit_message>
<xml_diff>
--- a/hardware/caravel_Nucleo/docs/Caravel+Nucleo Board.pptx
+++ b/hardware/caravel_Nucleo/docs/Caravel+Nucleo Board.pptx
@@ -9498,8 +9498,8 @@
           </a:p>
         </p:txBody>
       </p:sp>
-      <mc:AlternateContent xmlns:mc="http://schemas.openxmlformats.org/markup-compatibility/2006" xmlns:a14="http://schemas.microsoft.com/office/drawing/2010/main">
-        <mc:Choice Requires="a14">
+      <mc:AlternateContent xmlns:mc="http://schemas.openxmlformats.org/markup-compatibility/2006">
+        <mc:Choice xmlns:a14="http://schemas.microsoft.com/office/drawing/2010/main" Requires="a14">
           <p:sp>
             <p:nvSpPr>
               <p:cNvPr id="4" name="Content Placeholder 2">
@@ -9583,7 +9583,13 @@
                       <a:rPr lang="en-US" sz="2000" i="1">
                         <a:latin typeface="Cambria Math" panose="02040503050406030204" pitchFamily="18" charset="0"/>
                       </a:rPr>
-                      <m:t>𝑃𝐹</m:t>
+                      <m:t>𝑃</m:t>
+                    </m:r>
+                    <m:r>
+                      <a:rPr lang="en-US" sz="2000" b="0" i="1" smtClean="0">
+                        <a:latin typeface="Cambria Math" panose="02040503050406030204" pitchFamily="18" charset="0"/>
+                      </a:rPr>
+                      <m:t>𝐻</m:t>
                     </m:r>
                     <m:r>
                       <a:rPr lang="en-US" sz="2000" i="1">
@@ -9597,7 +9603,7 @@
                   <a:rPr lang="en-US" sz="2000" dirty="0">
                     <a:latin typeface="Cmbx12" panose="02000803000000000000" pitchFamily="2" charset="0"/>
                   </a:rPr>
-                  <a:t> and a timer should be used to supply the clock to caravel. I followed </a:t>
+                  <a:t> and a timer could be used to supply the clock to caravel as a PWM signal. I followed </a:t>
                 </a:r>
                 <a:r>
                   <a:rPr lang="en-US" sz="2000" dirty="0">
@@ -9662,12 +9668,9 @@
                     </m:r>
                   </m:oMath>
                 </a14:m>
-                <a:r>
-                  <a:rPr lang="en-US" sz="2000" dirty="0">
-                    <a:latin typeface="Cmbx12" panose="02000803000000000000" pitchFamily="2" charset="0"/>
-                  </a:rPr>
-                  <a:t> but I am not sure if this is the right way to do that</a:t>
-                </a:r>
+                <a:endParaRPr lang="en-US" sz="2000" b="0" dirty="0">
+                  <a:latin typeface="Cmbx12" panose="02000803000000000000" pitchFamily="2" charset="0"/>
+                </a:endParaRPr>
               </a:p>
               <a:p>
                 <a:r>
@@ -9762,7 +9765,7 @@
                   <a:rPr lang="en-US" sz="2000" b="0" dirty="0">
                     <a:latin typeface="Cmbx12" panose="02000803000000000000" pitchFamily="2" charset="0"/>
                   </a:rPr>
-                  <a:t>Caravel UART connected to UART3 (</a:t>
+                  <a:t>Caravel UART connected to UART8 (</a:t>
                 </a:r>
                 <a14:m>
                   <m:oMath xmlns:m="http://schemas.openxmlformats.org/officeDocument/2006/math">
@@ -9770,25 +9773,25 @@
                       <a:rPr lang="en-US" sz="2000" b="0" i="1" smtClean="0">
                         <a:latin typeface="Cambria Math" panose="02040503050406030204" pitchFamily="18" charset="0"/>
                       </a:rPr>
-                      <m:t>𝑃𝐶</m:t>
+                      <m:t>𝑃𝐸</m:t>
                     </m:r>
                     <m:r>
                       <a:rPr lang="en-US" sz="2000" b="0" i="1" smtClean="0">
                         <a:latin typeface="Cambria Math" panose="02040503050406030204" pitchFamily="18" charset="0"/>
                       </a:rPr>
-                      <m:t>10:</m:t>
+                      <m:t>0:</m:t>
                     </m:r>
                     <m:r>
                       <a:rPr lang="en-US" sz="2000" b="0" i="1" smtClean="0">
                         <a:latin typeface="Cambria Math" panose="02040503050406030204" pitchFamily="18" charset="0"/>
                       </a:rPr>
-                      <m:t>𝑃𝐶</m:t>
+                      <m:t>𝑃𝐸</m:t>
                     </m:r>
                     <m:r>
                       <a:rPr lang="en-US" sz="2000" b="0" i="1" smtClean="0">
                         <a:latin typeface="Cambria Math" panose="02040503050406030204" pitchFamily="18" charset="0"/>
                       </a:rPr>
-                      <m:t>11</m:t>
+                      <m:t>1</m:t>
                     </m:r>
                   </m:oMath>
                 </a14:m>
@@ -9865,7 +9868,7 @@
                   <a:rPr lang="en-US" sz="2000" b="0" dirty="0">
                     <a:latin typeface="Cmbx12" panose="02000803000000000000" pitchFamily="2" charset="0"/>
                   </a:rPr>
-                  <a:t> connected to pins that have no conflict on them and in the WCSP package order </a:t>
+                  <a:t> connected to pins that have no conflict on them and are in the order of the breakout board pinout order </a:t>
                 </a:r>
               </a:p>
               <a:p>
@@ -9889,7 +9892,7 @@
                   <a:rPr lang="en-US" sz="2000" b="0" dirty="0">
                     <a:latin typeface="Cmbx12" panose="02000803000000000000" pitchFamily="2" charset="0"/>
                   </a:rPr>
-                  <a:t> and </a:t>
+                  <a:t>, </a:t>
                 </a:r>
                 <a14:m>
                   <m:oMath xmlns:m="http://schemas.openxmlformats.org/officeDocument/2006/math">
@@ -9899,6 +9902,34 @@
                       </a:rPr>
                       <m:t>𝑥𝑐𝑙𝑘</m:t>
                     </m:r>
+                  </m:oMath>
+                </a14:m>
+                <a:r>
+                  <a:rPr lang="en-US" sz="2000" dirty="0">
+                    <a:latin typeface="Cmbx12" panose="02000803000000000000" pitchFamily="2" charset="0"/>
+                  </a:rPr>
+                  <a:t> and </a:t>
+                </a:r>
+                <a14:m>
+                  <m:oMath xmlns:m="http://schemas.openxmlformats.org/officeDocument/2006/math">
+                    <m:acc>
+                      <m:accPr>
+                        <m:chr m:val="̅"/>
+                        <m:ctrlPr>
+                          <a:rPr lang="en-US" sz="2000" i="1">
+                            <a:latin typeface="Cambria Math" panose="02040503050406030204" pitchFamily="18" charset="0"/>
+                          </a:rPr>
+                        </m:ctrlPr>
+                      </m:accPr>
+                      <m:e>
+                        <m:r>
+                          <a:rPr lang="en-US" sz="2000" i="1">
+                            <a:latin typeface="Cambria Math" panose="02040503050406030204" pitchFamily="18" charset="0"/>
+                          </a:rPr>
+                          <m:t>𝑅𝑆𝑇</m:t>
+                        </m:r>
+                      </m:e>
+                    </m:acc>
                   </m:oMath>
                 </a14:m>
                 <a:endParaRPr lang="en-US" sz="2000" b="0" dirty="0">
@@ -9964,7 +9995,7 @@
             </p:txBody>
           </p:sp>
         </mc:Choice>
-        <mc:Fallback xmlns="">
+        <mc:Fallback>
           <p:sp>
             <p:nvSpPr>
               <p:cNvPr id="4" name="Content Placeholder 2">
@@ -9989,7 +10020,7 @@
               <a:blipFill>
                 <a:blip r:embed="rId3"/>
                 <a:stretch>
-                  <a:fillRect l="-548" t="-1262" r="-1371"/>
+                  <a:fillRect l="-548" t="-1262"/>
                 </a:stretch>
               </a:blipFill>
             </p:spPr>
@@ -10104,7 +10135,7 @@
           <p:nvPr>
             <p:extLst>
               <p:ext uri="{D42A27DB-BD31-4B8C-83A1-F6EECF244321}">
-                <p14:modId xmlns:p14="http://schemas.microsoft.com/office/powerpoint/2010/main" val="1426340848"/>
+                <p14:modId xmlns:p14="http://schemas.microsoft.com/office/powerpoint/2010/main" val="3285185408"/>
               </p:ext>
             </p:extLst>
           </p:nvPr>
@@ -10639,7 +10670,7 @@
                           <a:ea typeface="+mn-ea"/>
                           <a:cs typeface="+mn-cs"/>
                         </a:rPr>
-                        <a:t>88: PB12</a:t>
+                        <a:t>GND</a:t>
                       </a:r>
                       <a:endParaRPr lang="en-GB" sz="1400" b="0" i="0" kern="1200" dirty="0">
                         <a:solidFill>
@@ -10936,7 +10967,7 @@
                           <a:ea typeface="+mn-ea"/>
                           <a:cs typeface="+mn-cs"/>
                         </a:rPr>
-                        <a:t>75: PB8</a:t>
+                        <a:t>GND</a:t>
                       </a:r>
                       <a:endParaRPr lang="en-GB" sz="1400" b="0" i="0" kern="1200" dirty="0">
                         <a:solidFill>
@@ -13069,7 +13100,7 @@
           <p:nvPr>
             <p:extLst>
               <p:ext uri="{D42A27DB-BD31-4B8C-83A1-F6EECF244321}">
-                <p14:modId xmlns:p14="http://schemas.microsoft.com/office/powerpoint/2010/main" val="3737103712"/>
+                <p14:modId xmlns:p14="http://schemas.microsoft.com/office/powerpoint/2010/main" val="4172414156"/>
               </p:ext>
             </p:extLst>
           </p:nvPr>
@@ -13906,7 +13937,7 @@
                           <a:ea typeface="+mn-ea"/>
                           <a:cs typeface="+mn-cs"/>
                         </a:rPr>
-                        <a:t>2: PC11</a:t>
+                        <a:t>136:PE0</a:t>
                       </a:r>
                       <a:endParaRPr lang="en-GB" sz="1400" b="0" i="0" kern="1200" dirty="0">
                         <a:solidFill>
@@ -14014,7 +14045,7 @@
                           <a:ea typeface="+mn-ea"/>
                           <a:cs typeface="+mn-cs"/>
                         </a:rPr>
-                        <a:t>1: PC10</a:t>
+                        <a:t>61: PE1</a:t>
                       </a:r>
                       <a:endParaRPr lang="en-GB" sz="1400" b="0" i="0" kern="1200" dirty="0">
                         <a:solidFill>
@@ -14538,7 +14569,7 @@
           <p:nvPr>
             <p:extLst>
               <p:ext uri="{D42A27DB-BD31-4B8C-83A1-F6EECF244321}">
-                <p14:modId xmlns:p14="http://schemas.microsoft.com/office/powerpoint/2010/main" val="2907692581"/>
+                <p14:modId xmlns:p14="http://schemas.microsoft.com/office/powerpoint/2010/main" val="772079285"/>
               </p:ext>
             </p:extLst>
           </p:nvPr>
@@ -15586,7 +15617,7 @@
                           <a:ea typeface="+mn-ea"/>
                           <a:cs typeface="+mn-cs"/>
                         </a:rPr>
-                        <a:t>101: PB5</a:t>
+                        <a:t>-</a:t>
                       </a:r>
                       <a:endParaRPr lang="en-GB" sz="1400" b="0" i="0" kern="1200" dirty="0">
                         <a:solidFill>
@@ -16080,10 +16111,10 @@
       </p:sp>
       <p:pic>
         <p:nvPicPr>
-          <p:cNvPr id="9" name="Picture 8">
+          <p:cNvPr id="6" name="Picture 5">
             <a:extLst>
               <a:ext uri="{FF2B5EF4-FFF2-40B4-BE49-F238E27FC236}">
-                <a16:creationId xmlns:a16="http://schemas.microsoft.com/office/drawing/2014/main" id="{E74C0DB8-8BDE-C997-34AA-5BA3817CD543}"/>
+                <a16:creationId xmlns:a16="http://schemas.microsoft.com/office/drawing/2014/main" id="{48661BE7-729E-5E10-12D2-A829073602EB}"/>
               </a:ext>
             </a:extLst>
           </p:cNvPr>
@@ -16100,8 +16131,8 @@
         </p:blipFill>
         <p:spPr>
           <a:xfrm>
-            <a:off x="2087871" y="1316496"/>
-            <a:ext cx="8016256" cy="5541504"/>
+            <a:off x="725049" y="1246909"/>
+            <a:ext cx="10741900" cy="5611091"/>
           </a:xfrm>
           <a:prstGeom prst="rect">
             <a:avLst/>
@@ -16166,10 +16197,22 @@
           <a:p>
             <a:pPr algn="ctr"/>
             <a:r>
-              <a:rPr lang="en-US">
+              <a:rPr lang="en-US" dirty="0">
                 <a:latin typeface="Cmbx12" panose="02000803000000000000" pitchFamily="2" charset="0"/>
               </a:rPr>
-              <a:t>Caravel + Nucleo Board Schematic</a:t>
+              <a:t>Caravel + </a:t>
+            </a:r>
+            <a:r>
+              <a:rPr lang="en-US" dirty="0" err="1">
+                <a:latin typeface="Cmbx12" panose="02000803000000000000" pitchFamily="2" charset="0"/>
+              </a:rPr>
+              <a:t>Nucleo</a:t>
+            </a:r>
+            <a:r>
+              <a:rPr lang="en-US" dirty="0">
+                <a:latin typeface="Cmbx12" panose="02000803000000000000" pitchFamily="2" charset="0"/>
+              </a:rPr>
+              <a:t> Board Modes</a:t>
             </a:r>
             <a:endParaRPr lang="en-GB" dirty="0">
               <a:latin typeface="Cmbx12" panose="02000803000000000000" pitchFamily="2" charset="0"/>
@@ -16177,40 +16220,89 @@
           </a:p>
         </p:txBody>
       </p:sp>
-      <p:pic>
-        <p:nvPicPr>
-          <p:cNvPr id="4" name="Picture 3">
+      <p:sp>
+        <p:nvSpPr>
+          <p:cNvPr id="4" name="Content Placeholder 2">
             <a:extLst>
               <a:ext uri="{FF2B5EF4-FFF2-40B4-BE49-F238E27FC236}">
-                <a16:creationId xmlns:a16="http://schemas.microsoft.com/office/drawing/2014/main" id="{4D6D9104-48E4-60D1-43ED-BAD46AD9E107}"/>
+                <a16:creationId xmlns:a16="http://schemas.microsoft.com/office/drawing/2014/main" id="{613680CD-ECE0-8998-34F4-7E72682558B8}"/>
               </a:ext>
             </a:extLst>
           </p:cNvPr>
-          <p:cNvPicPr>
-            <a:picLocks noChangeAspect="1"/>
-          </p:cNvPicPr>
-          <p:nvPr/>
-        </p:nvPicPr>
-        <p:blipFill>
-          <a:blip r:embed="rId2"/>
-          <a:stretch>
-            <a:fillRect/>
-          </a:stretch>
-        </p:blipFill>
+          <p:cNvSpPr>
+            <a:spLocks noGrp="1"/>
+          </p:cNvSpPr>
+          <p:nvPr>
+            <p:ph idx="1"/>
+          </p:nvPr>
+        </p:nvSpPr>
         <p:spPr>
           <a:xfrm>
-            <a:off x="2097696" y="1226721"/>
-            <a:ext cx="7996607" cy="5631279"/>
+            <a:off x="636125" y="1819688"/>
+            <a:ext cx="11118850" cy="4351338"/>
           </a:xfrm>
-          <a:prstGeom prst="rect">
-            <a:avLst/>
-          </a:prstGeom>
         </p:spPr>
-      </p:pic>
+        <p:txBody>
+          <a:bodyPr>
+            <a:normAutofit/>
+          </a:bodyPr>
+          <a:lstStyle/>
+          <a:p>
+            <a:pPr marL="0" indent="0">
+              <a:buNone/>
+            </a:pPr>
+            <a:r>
+              <a:rPr lang="en-US" sz="2000" dirty="0">
+                <a:latin typeface="Cmbx12" panose="02000803000000000000" pitchFamily="2" charset="0"/>
+              </a:rPr>
+              <a:t>The board has two modes of operation:</a:t>
+            </a:r>
+          </a:p>
+          <a:p>
+            <a:r>
+              <a:rPr lang="en-US" sz="2000" dirty="0">
+                <a:latin typeface="Cmbx12" panose="02000803000000000000" pitchFamily="2" charset="0"/>
+              </a:rPr>
+              <a:t>HAT mode:</a:t>
+            </a:r>
+          </a:p>
+          <a:p>
+            <a:r>
+              <a:rPr lang="en-US" sz="2000">
+                <a:latin typeface="Cmbx12" panose="02000803000000000000" pitchFamily="2" charset="0"/>
+              </a:rPr>
+              <a:t>MAIN mode:</a:t>
+            </a:r>
+            <a:endParaRPr lang="en-US" sz="2000" dirty="0">
+              <a:latin typeface="Cmbx12" panose="02000803000000000000" pitchFamily="2" charset="0"/>
+            </a:endParaRPr>
+          </a:p>
+          <a:p>
+            <a:endParaRPr lang="en-US" sz="2000" b="0" dirty="0">
+              <a:latin typeface="Cmbx12" panose="02000803000000000000" pitchFamily="2" charset="0"/>
+            </a:endParaRPr>
+          </a:p>
+          <a:p>
+            <a:endParaRPr lang="en-US" sz="2000" b="0" dirty="0">
+              <a:latin typeface="Cmbx12" panose="02000803000000000000" pitchFamily="2" charset="0"/>
+            </a:endParaRPr>
+          </a:p>
+          <a:p>
+            <a:endParaRPr lang="en-US" sz="2000" dirty="0">
+              <a:latin typeface="Cmbx12" panose="02000803000000000000" pitchFamily="2" charset="0"/>
+            </a:endParaRPr>
+          </a:p>
+          <a:p>
+            <a:endParaRPr lang="en-GB" dirty="0">
+              <a:latin typeface="Cmbx12" panose="02000803000000000000" pitchFamily="2" charset="0"/>
+            </a:endParaRPr>
+          </a:p>
+        </p:txBody>
+      </p:sp>
     </p:spTree>
     <p:extLst>
       <p:ext uri="{BB962C8B-B14F-4D97-AF65-F5344CB8AC3E}">
-        <p14:creationId xmlns:p14="http://schemas.microsoft.com/office/powerpoint/2010/main" val="3681793632"/>
+        <p14:creationId xmlns:p14="http://schemas.microsoft.com/office/powerpoint/2010/main" val="705409745"/>
       </p:ext>
     </p:extLst>
   </p:cSld>
@@ -18387,25 +18479,25 @@
                       <a:rPr lang="en-US" sz="2000" b="0" i="1" smtClean="0">
                         <a:latin typeface="Cambria Math" panose="02040503050406030204" pitchFamily="18" charset="0"/>
                       </a:rPr>
-                      <m:t>𝑃𝐶</m:t>
+                      <m:t>𝑃𝐸</m:t>
                     </m:r>
                     <m:r>
                       <a:rPr lang="en-US" sz="2000" b="0" i="1" smtClean="0">
                         <a:latin typeface="Cambria Math" panose="02040503050406030204" pitchFamily="18" charset="0"/>
                       </a:rPr>
-                      <m:t>10:</m:t>
+                      <m:t>0:</m:t>
                     </m:r>
                     <m:r>
                       <a:rPr lang="en-US" sz="2000" b="0" i="1" smtClean="0">
                         <a:latin typeface="Cambria Math" panose="02040503050406030204" pitchFamily="18" charset="0"/>
                       </a:rPr>
-                      <m:t>𝑃𝐶</m:t>
+                      <m:t>𝑃𝐸</m:t>
                     </m:r>
                     <m:r>
                       <a:rPr lang="en-US" sz="2000" b="0" i="1" smtClean="0">
                         <a:latin typeface="Cambria Math" panose="02040503050406030204" pitchFamily="18" charset="0"/>
                       </a:rPr>
-                      <m:t>11</m:t>
+                      <m:t>1</m:t>
                     </m:r>
                   </m:oMath>
                 </a14:m>

</xml_diff>